<commit_message>
changes made to presentation
</commit_message>
<xml_diff>
--- a/Presentation/Final Presentation.pptx
+++ b/Presentation/Final Presentation.pptx
@@ -9,11 +9,9 @@
     <p:sldId id="264" r:id="rId3"/>
     <p:sldId id="263" r:id="rId4"/>
     <p:sldId id="257" r:id="rId5"/>
-    <p:sldId id="258" r:id="rId6"/>
-    <p:sldId id="259" r:id="rId7"/>
-    <p:sldId id="260" r:id="rId8"/>
-    <p:sldId id="261" r:id="rId9"/>
-    <p:sldId id="262" r:id="rId10"/>
+    <p:sldId id="265" r:id="rId6"/>
+    <p:sldId id="258" r:id="rId7"/>
+    <p:sldId id="266" r:id="rId8"/>
   </p:sldIdLst>
   <p:sldSz cx="9144000" cy="6858000" type="screen4x3"/>
   <p:notesSz cx="6858000" cy="9144000"/>
@@ -4950,8 +4948,12 @@
               <a:buChar char="•"/>
             </a:pPr>
             <a:r>
+              <a:rPr lang="en-US" sz="2800" dirty="0" smtClean="0"/>
+              <a:t>Rachel Cohen</a:t>
+            </a:r>
+            <a:r>
               <a:rPr lang="en-US" sz="2800" b="0" dirty="0" smtClean="0"/>
-              <a:t>Rachel Cohen: </a:t>
+              <a:t>: </a:t>
             </a:r>
             <a:r>
               <a:rPr lang="en-US" sz="2800" b="0" i="1" dirty="0" smtClean="0"/>
@@ -4964,8 +4966,12 @@
               <a:buChar char="•"/>
             </a:pPr>
             <a:r>
+              <a:rPr lang="en-US" sz="2800" dirty="0" smtClean="0"/>
+              <a:t>Matt Walker</a:t>
+            </a:r>
+            <a:r>
               <a:rPr lang="en-US" sz="2800" b="0" dirty="0" smtClean="0"/>
-              <a:t>Matt Walker: </a:t>
+              <a:t>: </a:t>
             </a:r>
             <a:r>
               <a:rPr lang="en-US" sz="2800" b="0" i="1" dirty="0" smtClean="0"/>
@@ -4978,8 +4984,12 @@
               <a:buChar char="•"/>
             </a:pPr>
             <a:r>
+              <a:rPr lang="en-US" sz="2800" dirty="0" smtClean="0"/>
+              <a:t>Eric Forte</a:t>
+            </a:r>
+            <a:r>
               <a:rPr lang="en-US" sz="2800" b="0" dirty="0" smtClean="0"/>
-              <a:t>Eric Forte: </a:t>
+              <a:t>: </a:t>
             </a:r>
             <a:r>
               <a:rPr lang="en-US" sz="2800" b="0" i="1" dirty="0" smtClean="0"/>
@@ -4992,11 +5002,11 @@
               <a:buChar char="•"/>
             </a:pPr>
             <a:r>
-              <a:rPr lang="en-US" sz="2800" b="0" dirty="0" smtClean="0"/>
+              <a:rPr lang="en-US" sz="2800" dirty="0" smtClean="0"/>
               <a:t>Nick </a:t>
             </a:r>
             <a:r>
-              <a:rPr lang="en-US" sz="2800" b="0" dirty="0" err="1" smtClean="0"/>
+              <a:rPr lang="en-US" sz="2800" dirty="0" err="1" smtClean="0"/>
               <a:t>Keckeisen</a:t>
             </a:r>
             <a:r>
@@ -5014,8 +5024,12 @@
               <a:buChar char="•"/>
             </a:pPr>
             <a:r>
+              <a:rPr lang="en-US" sz="2800" dirty="0" smtClean="0"/>
+              <a:t>Stephen Masterson</a:t>
+            </a:r>
+            <a:r>
               <a:rPr lang="en-US" sz="2800" b="0" dirty="0" smtClean="0"/>
-              <a:t>Stephen Masterson: </a:t>
+              <a:t>: </a:t>
             </a:r>
             <a:r>
               <a:rPr lang="en-US" sz="2800" b="0" i="1" dirty="0" smtClean="0"/>
@@ -5460,19 +5474,86 @@
           <a:bodyPr/>
           <a:lstStyle/>
           <a:p>
-            <a:endParaRPr lang="en-US" dirty="0"/>
+            <a:r>
+              <a:rPr lang="en-US" sz="4000" dirty="0" smtClean="0"/>
+              <a:t>Design technologies</a:t>
+            </a:r>
+            <a:endParaRPr lang="en-US" sz="4000" dirty="0"/>
+          </a:p>
+        </p:txBody>
+      </p:sp>
+      <p:sp>
+        <p:nvSpPr>
+          <p:cNvPr id="3" name="Content Placeholder 2"/>
+          <p:cNvSpPr>
+            <a:spLocks noGrp="1"/>
+          </p:cNvSpPr>
+          <p:nvPr>
+            <p:ph idx="1"/>
+          </p:nvPr>
+        </p:nvSpPr>
+        <p:spPr>
+          <a:xfrm>
+            <a:off x="609600" y="1100628"/>
+            <a:ext cx="7734300" cy="3776172"/>
+          </a:xfrm>
+        </p:spPr>
+        <p:txBody>
+          <a:bodyPr>
+            <a:normAutofit/>
+          </a:bodyPr>
+          <a:lstStyle/>
+          <a:p>
+            <a:pPr>
+              <a:buFont typeface="Arial" panose="020B0604020202020204" pitchFamily="34" charset="0"/>
+              <a:buChar char="•"/>
+            </a:pPr>
+            <a:r>
+              <a:rPr lang="en-US" sz="2800" b="0" dirty="0" smtClean="0"/>
+              <a:t>Amazon Web Services</a:t>
+            </a:r>
+            <a:endParaRPr lang="en-US" sz="2800" dirty="0"/>
+          </a:p>
+          <a:p>
+            <a:pPr>
+              <a:buFont typeface="Arial" panose="020B0604020202020204" pitchFamily="34" charset="0"/>
+              <a:buChar char="•"/>
+            </a:pPr>
+            <a:r>
+              <a:rPr lang="en-US" sz="2800" b="0" dirty="0" smtClean="0"/>
+              <a:t>Django Web Framework using Python </a:t>
+            </a:r>
+          </a:p>
+          <a:p>
+            <a:pPr>
+              <a:buFont typeface="Arial" panose="020B0604020202020204" pitchFamily="34" charset="0"/>
+              <a:buChar char="•"/>
+            </a:pPr>
+            <a:r>
+              <a:rPr lang="en-US" sz="2800" b="0" dirty="0" smtClean="0"/>
+              <a:t>SQLite Database</a:t>
+            </a:r>
+          </a:p>
+          <a:p>
+            <a:pPr>
+              <a:buFont typeface="Arial" panose="020B0604020202020204" pitchFamily="34" charset="0"/>
+              <a:buChar char="•"/>
+            </a:pPr>
+            <a:endParaRPr lang="en-US" sz="2800" b="0" dirty="0"/>
+          </a:p>
+          <a:p>
+            <a:pPr marL="0" indent="0"/>
+            <a:endParaRPr lang="en-US" sz="2800" b="0" dirty="0" smtClean="0"/>
           </a:p>
         </p:txBody>
       </p:sp>
       <p:pic>
         <p:nvPicPr>
-          <p:cNvPr id="4" name="Content Placeholder 3"/>
+          <p:cNvPr id="5" name="Picture 4"/>
           <p:cNvPicPr>
-            <a:picLocks noGrp="1" noChangeAspect="1"/>
+            <a:picLocks noChangeAspect="1"/>
           </p:cNvPicPr>
-          <p:nvPr>
-            <p:ph idx="1"/>
-          </p:nvPr>
+          <p:nvPr/>
         </p:nvPicPr>
         <p:blipFill>
           <a:blip r:embed="rId2">
@@ -5488,28 +5569,84 @@
         </p:blipFill>
         <p:spPr>
           <a:xfrm>
-            <a:off x="381000" y="0"/>
-            <a:ext cx="8382000" cy="5029200"/>
+            <a:off x="634042" y="2615103"/>
+            <a:ext cx="2447925" cy="2447925"/>
           </a:xfrm>
+          <a:prstGeom prst="rect">
+            <a:avLst/>
+          </a:prstGeom>
+        </p:spPr>
+      </p:pic>
+      <p:pic>
+        <p:nvPicPr>
+          <p:cNvPr id="6" name="Picture 5"/>
+          <p:cNvPicPr>
+            <a:picLocks noChangeAspect="1"/>
+          </p:cNvPicPr>
+          <p:nvPr/>
+        </p:nvPicPr>
+        <p:blipFill>
+          <a:blip r:embed="rId3">
+            <a:extLst>
+              <a:ext uri="{28A0092B-C50C-407E-A947-70E740481C1C}">
+                <a14:useLocalDpi xmlns:a14="http://schemas.microsoft.com/office/drawing/2010/main" val="0"/>
+              </a:ext>
+            </a:extLst>
+          </a:blip>
+          <a:stretch>
+            <a:fillRect/>
+          </a:stretch>
+        </p:blipFill>
+        <p:spPr>
+          <a:xfrm>
+            <a:off x="2807736" y="1838815"/>
+            <a:ext cx="4000500" cy="4000500"/>
+          </a:xfrm>
+          <a:prstGeom prst="rect">
+            <a:avLst/>
+          </a:prstGeom>
+        </p:spPr>
+      </p:pic>
+      <p:pic>
+        <p:nvPicPr>
+          <p:cNvPr id="7" name="Picture 6"/>
+          <p:cNvPicPr>
+            <a:picLocks noChangeAspect="1"/>
+          </p:cNvPicPr>
+          <p:nvPr/>
+        </p:nvPicPr>
+        <p:blipFill>
+          <a:blip r:embed="rId4">
+            <a:extLst>
+              <a:ext uri="{28A0092B-C50C-407E-A947-70E740481C1C}">
+                <a14:useLocalDpi xmlns:a14="http://schemas.microsoft.com/office/drawing/2010/main" val="0"/>
+              </a:ext>
+            </a:extLst>
+          </a:blip>
+          <a:stretch>
+            <a:fillRect/>
+          </a:stretch>
+        </p:blipFill>
+        <p:spPr>
+          <a:xfrm>
+            <a:off x="6639597" y="2781008"/>
+            <a:ext cx="2095792" cy="2095792"/>
+          </a:xfrm>
+          <a:prstGeom prst="rect">
+            <a:avLst/>
+          </a:prstGeom>
         </p:spPr>
       </p:pic>
     </p:spTree>
     <p:extLst>
       <p:ext uri="{BB962C8B-B14F-4D97-AF65-F5344CB8AC3E}">
-        <p14:creationId xmlns:p14="http://schemas.microsoft.com/office/powerpoint/2010/main" val="3737330067"/>
+        <p14:creationId xmlns:p14="http://schemas.microsoft.com/office/powerpoint/2010/main" val="1424466416"/>
       </p:ext>
     </p:extLst>
   </p:cSld>
   <p:clrMapOvr>
     <a:masterClrMapping/>
   </p:clrMapOvr>
-  <p:timing>
-    <p:tnLst>
-      <p:par>
-        <p:cTn id="1" dur="indefinite" restart="never" nodeType="tmRoot"/>
-      </p:par>
-    </p:tnLst>
-  </p:timing>
 </p:sld>
 </file>
 
@@ -5545,11 +5682,7 @@
           <a:bodyPr/>
           <a:lstStyle/>
           <a:p>
-            <a:r>
-              <a:rPr lang="en-US" sz="4000" dirty="0" smtClean="0"/>
-              <a:t>Design technologies</a:t>
-            </a:r>
-            <a:endParaRPr lang="en-US" sz="4000" dirty="0"/>
+            <a:endParaRPr lang="en-US" dirty="0"/>
           </a:p>
         </p:txBody>
       </p:sp>
@@ -5568,74 +5701,37 @@
           <a:bodyPr/>
           <a:lstStyle/>
           <a:p>
-            <a:pPr>
-              <a:buFontTx/>
-              <a:buChar char="-"/>
-            </a:pPr>
-            <a:r>
-              <a:rPr lang="en-US" sz="2000" b="0" dirty="0" smtClean="0"/>
-              <a:t>Amazon Web </a:t>
-            </a:r>
-            <a:r>
-              <a:rPr lang="en-US" sz="2000" b="0" dirty="0" smtClean="0"/>
-              <a:t>Services </a:t>
-            </a:r>
-            <a:r>
-              <a:rPr lang="en-US" sz="2000" b="0" dirty="0" smtClean="0"/>
-              <a:t>for easy and reliable website hosting</a:t>
-            </a:r>
-          </a:p>
-          <a:p>
-            <a:pPr>
-              <a:buFontTx/>
-              <a:buChar char="-"/>
-            </a:pPr>
-            <a:r>
-              <a:rPr lang="en-US" sz="2000" b="0" dirty="0" err="1" smtClean="0"/>
-              <a:t>Django</a:t>
-            </a:r>
-            <a:r>
-              <a:rPr lang="en-US" sz="2000" b="0" dirty="0" smtClean="0"/>
-              <a:t> web framework using Python for a clean &amp; pragmatic design</a:t>
-            </a:r>
-          </a:p>
-          <a:p>
-            <a:pPr lvl="2">
-              <a:buFontTx/>
-              <a:buChar char="-"/>
-            </a:pPr>
-            <a:r>
-              <a:rPr lang="en-US" sz="2000" dirty="0" smtClean="0"/>
-              <a:t>Python REST API</a:t>
-            </a:r>
-          </a:p>
-          <a:p>
-            <a:pPr lvl="1">
-              <a:buFontTx/>
-              <a:buChar char="-"/>
-            </a:pPr>
-            <a:r>
-              <a:rPr lang="en-US" sz="2000" dirty="0" err="1" smtClean="0"/>
-              <a:t>MangoDB</a:t>
-            </a:r>
-            <a:r>
-              <a:rPr lang="en-US" sz="2000" dirty="0" smtClean="0"/>
-              <a:t> for data storage &amp; retrieval</a:t>
-            </a:r>
-          </a:p>
-          <a:p>
-            <a:pPr lvl="1">
-              <a:buFontTx/>
-              <a:buChar char="-"/>
-            </a:pPr>
-            <a:endParaRPr lang="en-US" b="1" dirty="0"/>
-          </a:p>
-        </p:txBody>
-      </p:sp>
+            <a:endParaRPr lang="en-US"/>
+          </a:p>
+        </p:txBody>
+      </p:sp>
+      <p:pic>
+        <p:nvPicPr>
+          <p:cNvPr id="5" name="Picture 4"/>
+          <p:cNvPicPr/>
+          <p:nvPr/>
+        </p:nvPicPr>
+        <p:blipFill>
+          <a:blip r:embed="rId2"/>
+          <a:stretch/>
+        </p:blipFill>
+        <p:spPr>
+          <a:xfrm>
+            <a:off x="0" y="0"/>
+            <a:ext cx="9144000" cy="6858000"/>
+          </a:xfrm>
+          <a:prstGeom prst="rect">
+            <a:avLst/>
+          </a:prstGeom>
+          <a:ln>
+            <a:noFill/>
+          </a:ln>
+        </p:spPr>
+      </p:pic>
     </p:spTree>
     <p:extLst>
       <p:ext uri="{BB962C8B-B14F-4D97-AF65-F5344CB8AC3E}">
-        <p14:creationId xmlns:p14="http://schemas.microsoft.com/office/powerpoint/2010/main" val="2819590656"/>
+        <p14:creationId xmlns:p14="http://schemas.microsoft.com/office/powerpoint/2010/main" val="3737330067"/>
       </p:ext>
     </p:extLst>
   </p:cSld>
@@ -5669,18 +5765,41 @@
           <a:chExt cx="0" cy="0"/>
         </a:xfrm>
       </p:grpSpPr>
+      <p:sp>
+        <p:nvSpPr>
+          <p:cNvPr id="2" name="Title 1"/>
+          <p:cNvSpPr>
+            <a:spLocks noGrp="1"/>
+          </p:cNvSpPr>
+          <p:nvPr>
+            <p:ph type="title"/>
+          </p:nvPr>
+        </p:nvSpPr>
+        <p:spPr/>
+        <p:txBody>
+          <a:bodyPr/>
+          <a:lstStyle/>
+          <a:p>
+            <a:r>
+              <a:rPr lang="en-US" sz="4000" dirty="0" smtClean="0"/>
+              <a:t>Demo Time!</a:t>
+            </a:r>
+            <a:endParaRPr lang="en-US" sz="4000" dirty="0"/>
+          </a:p>
+        </p:txBody>
+      </p:sp>
       <p:pic>
         <p:nvPicPr>
-          <p:cNvPr id="6" name="Content Placeholder 5"/>
+          <p:cNvPr id="4" name="Content Placeholder 3"/>
           <p:cNvPicPr>
             <a:picLocks noGrp="1" noChangeAspect="1"/>
           </p:cNvPicPr>
           <p:nvPr>
-            <p:ph sz="half" idx="1"/>
+            <p:ph idx="1"/>
           </p:nvPr>
         </p:nvPicPr>
         <p:blipFill>
-          <a:blip r:embed="rId2" cstate="print">
+          <a:blip r:embed="rId2">
             <a:extLst>
               <a:ext uri="{28A0092B-C50C-407E-A947-70E740481C1C}">
                 <a14:useLocalDpi xmlns:a14="http://schemas.microsoft.com/office/drawing/2010/main" val="0"/>
@@ -5693,274 +5812,15 @@
         </p:blipFill>
         <p:spPr>
           <a:xfrm>
-            <a:off x="152400" y="762000"/>
-            <a:ext cx="3581400" cy="5735594"/>
-          </a:xfrm>
-        </p:spPr>
-      </p:pic>
-      <p:pic>
-        <p:nvPicPr>
-          <p:cNvPr id="9" name="Content Placeholder 8"/>
-          <p:cNvPicPr>
-            <a:picLocks noGrp="1" noChangeAspect="1"/>
-          </p:cNvPicPr>
-          <p:nvPr>
-            <p:ph sz="half" idx="2"/>
-          </p:nvPr>
-        </p:nvPicPr>
-        <p:blipFill>
-          <a:blip r:embed="rId3" cstate="print">
-            <a:extLst>
-              <a:ext uri="{28A0092B-C50C-407E-A947-70E740481C1C}">
-                <a14:useLocalDpi xmlns:a14="http://schemas.microsoft.com/office/drawing/2010/main" val="0"/>
-              </a:ext>
-            </a:extLst>
-          </a:blip>
-          <a:stretch>
-            <a:fillRect/>
-          </a:stretch>
-        </p:blipFill>
-        <p:spPr>
-          <a:xfrm>
-            <a:off x="5257800" y="990600"/>
-            <a:ext cx="3691105" cy="5532057"/>
-          </a:xfrm>
-        </p:spPr>
-      </p:pic>
-      <p:sp>
-        <p:nvSpPr>
-          <p:cNvPr id="7" name="Title 6"/>
-          <p:cNvSpPr>
-            <a:spLocks noGrp="1"/>
-          </p:cNvSpPr>
-          <p:nvPr>
-            <p:ph type="title"/>
-          </p:nvPr>
-        </p:nvSpPr>
-        <p:spPr/>
-        <p:txBody>
-          <a:bodyPr/>
-          <a:lstStyle/>
-          <a:p>
-            <a:r>
-              <a:rPr lang="en-US" dirty="0" smtClean="0"/>
-              <a:t>Home &amp; Rental pages</a:t>
-            </a:r>
-            <a:endParaRPr lang="en-US" dirty="0"/>
-          </a:p>
-        </p:txBody>
-      </p:sp>
-    </p:spTree>
-    <p:extLst>
-      <p:ext uri="{BB962C8B-B14F-4D97-AF65-F5344CB8AC3E}">
-        <p14:creationId xmlns:p14="http://schemas.microsoft.com/office/powerpoint/2010/main" val="2949378365"/>
-      </p:ext>
-    </p:extLst>
-  </p:cSld>
-  <p:clrMapOvr>
-    <a:masterClrMapping/>
-  </p:clrMapOvr>
-  <p:timing>
-    <p:tnLst>
-      <p:par>
-        <p:cTn id="1" dur="indefinite" restart="never" nodeType="tmRoot"/>
-      </p:par>
-    </p:tnLst>
-  </p:timing>
-</p:sld>
-</file>
-
-<file path=ppt/slides/slide8.xml><?xml version="1.0" encoding="utf-8"?>
-<p:sld xmlns:a="http://schemas.openxmlformats.org/drawingml/2006/main" xmlns:r="http://schemas.openxmlformats.org/officeDocument/2006/relationships" xmlns:p="http://schemas.openxmlformats.org/presentationml/2006/main">
-  <p:cSld>
-    <p:spTree>
-      <p:nvGrpSpPr>
-        <p:cNvPr id="1" name=""/>
-        <p:cNvGrpSpPr/>
-        <p:nvPr/>
-      </p:nvGrpSpPr>
-      <p:grpSpPr>
-        <a:xfrm>
-          <a:off x="0" y="0"/>
-          <a:ext cx="0" cy="0"/>
-          <a:chOff x="0" y="0"/>
-          <a:chExt cx="0" cy="0"/>
-        </a:xfrm>
-      </p:grpSpPr>
-      <p:pic>
-        <p:nvPicPr>
-          <p:cNvPr id="5" name="Content Placeholder 4"/>
-          <p:cNvPicPr>
-            <a:picLocks noGrp="1" noChangeAspect="1"/>
-          </p:cNvPicPr>
-          <p:nvPr>
-            <p:ph sz="half" idx="1"/>
-          </p:nvPr>
-        </p:nvPicPr>
-        <p:blipFill>
-          <a:blip r:embed="rId2" cstate="print">
-            <a:extLst>
-              <a:ext uri="{28A0092B-C50C-407E-A947-70E740481C1C}">
-                <a14:useLocalDpi xmlns:a14="http://schemas.microsoft.com/office/drawing/2010/main" val="0"/>
-              </a:ext>
-            </a:extLst>
-          </a:blip>
-          <a:stretch>
-            <a:fillRect/>
-          </a:stretch>
-        </p:blipFill>
-        <p:spPr>
-          <a:xfrm>
-            <a:off x="152400" y="1143000"/>
-            <a:ext cx="3602565" cy="5324185"/>
-          </a:xfrm>
-        </p:spPr>
-      </p:pic>
-      <p:pic>
-        <p:nvPicPr>
-          <p:cNvPr id="6" name="Content Placeholder 5"/>
-          <p:cNvPicPr>
-            <a:picLocks noGrp="1" noChangeAspect="1"/>
-          </p:cNvPicPr>
-          <p:nvPr>
-            <p:ph sz="half" idx="2"/>
-          </p:nvPr>
-        </p:nvPicPr>
-        <p:blipFill>
-          <a:blip r:embed="rId3" cstate="print">
-            <a:extLst>
-              <a:ext uri="{28A0092B-C50C-407E-A947-70E740481C1C}">
-                <a14:useLocalDpi xmlns:a14="http://schemas.microsoft.com/office/drawing/2010/main" val="0"/>
-              </a:ext>
-            </a:extLst>
-          </a:blip>
-          <a:stretch>
-            <a:fillRect/>
-          </a:stretch>
-        </p:blipFill>
-        <p:spPr>
-          <a:xfrm>
-            <a:off x="5257800" y="990600"/>
-            <a:ext cx="3624247" cy="5434115"/>
-          </a:xfrm>
-        </p:spPr>
-      </p:pic>
-      <p:sp>
-        <p:nvSpPr>
-          <p:cNvPr id="4" name="Title 3"/>
-          <p:cNvSpPr>
-            <a:spLocks noGrp="1"/>
-          </p:cNvSpPr>
-          <p:nvPr>
-            <p:ph type="title"/>
-          </p:nvPr>
-        </p:nvSpPr>
-        <p:spPr/>
-        <p:txBody>
-          <a:bodyPr/>
-          <a:lstStyle/>
-          <a:p>
-            <a:r>
-              <a:rPr lang="en-US" dirty="0" smtClean="0"/>
-              <a:t>Search &amp; Maps pages</a:t>
-            </a:r>
-            <a:endParaRPr lang="en-US" dirty="0"/>
-          </a:p>
-        </p:txBody>
-      </p:sp>
-    </p:spTree>
-    <p:extLst>
-      <p:ext uri="{BB962C8B-B14F-4D97-AF65-F5344CB8AC3E}">
-        <p14:creationId xmlns:p14="http://schemas.microsoft.com/office/powerpoint/2010/main" val="1922906156"/>
-      </p:ext>
-    </p:extLst>
-  </p:cSld>
-  <p:clrMapOvr>
-    <a:masterClrMapping/>
-  </p:clrMapOvr>
-  <p:timing>
-    <p:tnLst>
-      <p:par>
-        <p:cTn id="1" dur="indefinite" restart="never" nodeType="tmRoot"/>
-      </p:par>
-    </p:tnLst>
-  </p:timing>
-</p:sld>
-</file>
-
-<file path=ppt/slides/slide9.xml><?xml version="1.0" encoding="utf-8"?>
-<p:sld xmlns:a="http://schemas.openxmlformats.org/drawingml/2006/main" xmlns:r="http://schemas.openxmlformats.org/officeDocument/2006/relationships" xmlns:p="http://schemas.openxmlformats.org/presentationml/2006/main">
-  <p:cSld>
-    <p:spTree>
-      <p:nvGrpSpPr>
-        <p:cNvPr id="1" name=""/>
-        <p:cNvGrpSpPr/>
-        <p:nvPr/>
-      </p:nvGrpSpPr>
-      <p:grpSpPr>
-        <a:xfrm>
-          <a:off x="0" y="0"/>
-          <a:ext cx="0" cy="0"/>
-          <a:chOff x="0" y="0"/>
-          <a:chExt cx="0" cy="0"/>
-        </a:xfrm>
-      </p:grpSpPr>
-      <p:sp>
-        <p:nvSpPr>
-          <p:cNvPr id="5" name="Title 4"/>
-          <p:cNvSpPr>
-            <a:spLocks noGrp="1"/>
-          </p:cNvSpPr>
-          <p:nvPr>
-            <p:ph type="title"/>
-          </p:nvPr>
-        </p:nvSpPr>
-        <p:spPr/>
-        <p:txBody>
-          <a:bodyPr/>
-          <a:lstStyle/>
-          <a:p>
-            <a:r>
-              <a:rPr lang="en-US" dirty="0" smtClean="0"/>
-              <a:t>User Page</a:t>
-            </a:r>
-            <a:endParaRPr lang="en-US" dirty="0"/>
-          </a:p>
-        </p:txBody>
-      </p:sp>
-      <p:pic>
-        <p:nvPicPr>
-          <p:cNvPr id="7" name="Content Placeholder 6"/>
-          <p:cNvPicPr>
-            <a:picLocks noGrp="1" noChangeAspect="1"/>
-          </p:cNvPicPr>
-          <p:nvPr>
-            <p:ph idx="1"/>
-          </p:nvPr>
-        </p:nvPicPr>
-        <p:blipFill>
-          <a:blip r:embed="rId2" cstate="print">
-            <a:extLst>
-              <a:ext uri="{28A0092B-C50C-407E-A947-70E740481C1C}">
-                <a14:useLocalDpi xmlns:a14="http://schemas.microsoft.com/office/drawing/2010/main" val="0"/>
-              </a:ext>
-            </a:extLst>
-          </a:blip>
-          <a:stretch>
-            <a:fillRect/>
-          </a:stretch>
-        </p:blipFill>
-        <p:spPr>
-          <a:xfrm>
-            <a:off x="2590800" y="914400"/>
-            <a:ext cx="3878332" cy="5783817"/>
+            <a:off x="3669644" y="1726739"/>
+            <a:ext cx="1826936" cy="2326610"/>
           </a:xfrm>
         </p:spPr>
       </p:pic>
     </p:spTree>
     <p:extLst>
       <p:ext uri="{BB962C8B-B14F-4D97-AF65-F5344CB8AC3E}">
-        <p14:creationId xmlns:p14="http://schemas.microsoft.com/office/powerpoint/2010/main" val="4290614556"/>
+        <p14:creationId xmlns:p14="http://schemas.microsoft.com/office/powerpoint/2010/main" val="411876970"/>
       </p:ext>
     </p:extLst>
   </p:cSld>

</xml_diff>